<commit_message>
doc: update to using Rocky 9.4 and bootstrap changes
(fixes #15)
</commit_message>
<xml_diff>
--- a/presentations/EPICS Training VM.pptx
+++ b/presentations/EPICS Training VM.pptx
@@ -250,7 +250,7 @@
           <a:p>
             <a:fld id="{E00E58FE-3AE1-4995-80E6-8AF0F1DA0E4E}" type="datetimeFigureOut">
               <a:rPr lang="de-DE" smtClean="0"/>
-              <a:t>16.04.2024</a:t>
+              <a:t>14.06.2024</a:t>
             </a:fld>
             <a:endParaRPr lang="de-DE"/>
           </a:p>
@@ -427,7 +427,7 @@
           <a:p>
             <a:fld id="{45091381-FB9B-4B1C-99E3-890DFD4525D3}" type="datetimeFigureOut">
               <a:rPr lang="de-DE" smtClean="0"/>
-              <a:t>16.04.2024</a:t>
+              <a:t>14.06.2024</a:t>
             </a:fld>
             <a:endParaRPr lang="de-DE"/>
           </a:p>
@@ -855,7 +855,7 @@
           <a:p>
             <a:fld id="{77B9AAF2-2243-4209-A85C-F7036AF186DC}" type="datetimeFigureOut">
               <a:rPr lang="de-DE" smtClean="0"/>
-              <a:t>16.04.2024</a:t>
+              <a:t>14.06.2024</a:t>
             </a:fld>
             <a:endParaRPr lang="de-DE"/>
           </a:p>
@@ -1093,7 +1093,7 @@
           <a:p>
             <a:fld id="{77B9AAF2-2243-4209-A85C-F7036AF186DC}" type="datetimeFigureOut">
               <a:rPr lang="de-DE" smtClean="0"/>
-              <a:t>16.04.2024</a:t>
+              <a:t>14.06.2024</a:t>
             </a:fld>
             <a:endParaRPr lang="de-DE"/>
           </a:p>
@@ -1331,7 +1331,7 @@
           <a:p>
             <a:fld id="{77B9AAF2-2243-4209-A85C-F7036AF186DC}" type="datetimeFigureOut">
               <a:rPr lang="de-DE" smtClean="0"/>
-              <a:t>16.04.2024</a:t>
+              <a:t>14.06.2024</a:t>
             </a:fld>
             <a:endParaRPr lang="de-DE"/>
           </a:p>
@@ -1569,7 +1569,7 @@
           <a:p>
             <a:fld id="{77B9AAF2-2243-4209-A85C-F7036AF186DC}" type="datetimeFigureOut">
               <a:rPr lang="de-DE" smtClean="0"/>
-              <a:t>16.04.2024</a:t>
+              <a:t>14.06.2024</a:t>
             </a:fld>
             <a:endParaRPr lang="de-DE"/>
           </a:p>
@@ -1874,7 +1874,7 @@
           <a:p>
             <a:fld id="{77B9AAF2-2243-4209-A85C-F7036AF186DC}" type="datetimeFigureOut">
               <a:rPr lang="de-DE" smtClean="0"/>
-              <a:t>16.04.2024</a:t>
+              <a:t>14.06.2024</a:t>
             </a:fld>
             <a:endParaRPr lang="de-DE"/>
           </a:p>
@@ -2177,7 +2177,7 @@
           <a:p>
             <a:fld id="{77B9AAF2-2243-4209-A85C-F7036AF186DC}" type="datetimeFigureOut">
               <a:rPr lang="de-DE" smtClean="0"/>
-              <a:t>16.04.2024</a:t>
+              <a:t>14.06.2024</a:t>
             </a:fld>
             <a:endParaRPr lang="de-DE"/>
           </a:p>
@@ -2628,7 +2628,7 @@
           <a:p>
             <a:fld id="{77B9AAF2-2243-4209-A85C-F7036AF186DC}" type="datetimeFigureOut">
               <a:rPr lang="de-DE" smtClean="0"/>
-              <a:t>16.04.2024</a:t>
+              <a:t>14.06.2024</a:t>
             </a:fld>
             <a:endParaRPr lang="de-DE"/>
           </a:p>
@@ -2801,7 +2801,7 @@
           <a:p>
             <a:fld id="{77B9AAF2-2243-4209-A85C-F7036AF186DC}" type="datetimeFigureOut">
               <a:rPr lang="de-DE" smtClean="0"/>
-              <a:t>16.04.2024</a:t>
+              <a:t>14.06.2024</a:t>
             </a:fld>
             <a:endParaRPr lang="de-DE"/>
           </a:p>
@@ -3175,7 +3175,7 @@
           <a:p>
             <a:fld id="{77B9AAF2-2243-4209-A85C-F7036AF186DC}" type="datetimeFigureOut">
               <a:rPr lang="de-DE" smtClean="0"/>
-              <a:t>16.04.2024</a:t>
+              <a:t>14.06.2024</a:t>
             </a:fld>
             <a:endParaRPr lang="de-DE"/>
           </a:p>
@@ -3496,7 +3496,7 @@
           <a:p>
             <a:fld id="{77B9AAF2-2243-4209-A85C-F7036AF186DC}" type="datetimeFigureOut">
               <a:rPr lang="de-DE" smtClean="0"/>
-              <a:t>16.04.2024</a:t>
+              <a:t>14.06.2024</a:t>
             </a:fld>
             <a:endParaRPr lang="de-DE"/>
           </a:p>
@@ -4689,8 +4689,27 @@
                 <a:ea typeface="Milo-Medium"/>
                 <a:cs typeface="Source Sans Pro"/>
               </a:rPr>
-              <a:t>Using Rocky Linux 9.3</a:t>
-            </a:r>
+              <a:t>Using Rocky </a:t>
+            </a:r>
+            <a:r>
+              <a:rPr lang="en-GB" sz="2400">
+                <a:solidFill>
+                  <a:srgbClr val="60737F"/>
+                </a:solidFill>
+                <a:latin typeface="Source Sans Pro"/>
+                <a:ea typeface="Milo-Medium"/>
+                <a:cs typeface="Source Sans Pro"/>
+              </a:rPr>
+              <a:t>Linux 9.4</a:t>
+            </a:r>
+            <a:endParaRPr lang="en-GB" sz="2400" dirty="0">
+              <a:solidFill>
+                <a:srgbClr val="60737F"/>
+              </a:solidFill>
+              <a:latin typeface="Source Sans Pro"/>
+              <a:ea typeface="Milo-Medium"/>
+              <a:cs typeface="Source Sans Pro"/>
+            </a:endParaRPr>
           </a:p>
           <a:p>
             <a:pPr marL="800100" lvl="1" indent="-342900" eaLnBrk="0" hangingPunct="0">

</xml_diff>

<commit_message>
slides: update presentation for 2024-fall-oakridge
</commit_message>
<xml_diff>
--- a/presentations/EPICS Training VM.pptx
+++ b/presentations/EPICS Training VM.pptx
@@ -250,7 +250,7 @@
           <a:p>
             <a:fld id="{E00E58FE-3AE1-4995-80E6-8AF0F1DA0E4E}" type="datetimeFigureOut">
               <a:rPr lang="de-DE" smtClean="0"/>
-              <a:t>14.06.2024</a:t>
+              <a:t>13.09.2024</a:t>
             </a:fld>
             <a:endParaRPr lang="de-DE"/>
           </a:p>
@@ -427,7 +427,7 @@
           <a:p>
             <a:fld id="{45091381-FB9B-4B1C-99E3-890DFD4525D3}" type="datetimeFigureOut">
               <a:rPr lang="de-DE" smtClean="0"/>
-              <a:t>14.06.2024</a:t>
+              <a:t>13.09.2024</a:t>
             </a:fld>
             <a:endParaRPr lang="de-DE"/>
           </a:p>
@@ -855,7 +855,7 @@
           <a:p>
             <a:fld id="{77B9AAF2-2243-4209-A85C-F7036AF186DC}" type="datetimeFigureOut">
               <a:rPr lang="de-DE" smtClean="0"/>
-              <a:t>14.06.2024</a:t>
+              <a:t>13.09.2024</a:t>
             </a:fld>
             <a:endParaRPr lang="de-DE"/>
           </a:p>
@@ -1093,7 +1093,7 @@
           <a:p>
             <a:fld id="{77B9AAF2-2243-4209-A85C-F7036AF186DC}" type="datetimeFigureOut">
               <a:rPr lang="de-DE" smtClean="0"/>
-              <a:t>14.06.2024</a:t>
+              <a:t>13.09.2024</a:t>
             </a:fld>
             <a:endParaRPr lang="de-DE"/>
           </a:p>
@@ -1331,7 +1331,7 @@
           <a:p>
             <a:fld id="{77B9AAF2-2243-4209-A85C-F7036AF186DC}" type="datetimeFigureOut">
               <a:rPr lang="de-DE" smtClean="0"/>
-              <a:t>14.06.2024</a:t>
+              <a:t>13.09.2024</a:t>
             </a:fld>
             <a:endParaRPr lang="de-DE"/>
           </a:p>
@@ -1569,7 +1569,7 @@
           <a:p>
             <a:fld id="{77B9AAF2-2243-4209-A85C-F7036AF186DC}" type="datetimeFigureOut">
               <a:rPr lang="de-DE" smtClean="0"/>
-              <a:t>14.06.2024</a:t>
+              <a:t>13.09.2024</a:t>
             </a:fld>
             <a:endParaRPr lang="de-DE"/>
           </a:p>
@@ -1874,7 +1874,7 @@
           <a:p>
             <a:fld id="{77B9AAF2-2243-4209-A85C-F7036AF186DC}" type="datetimeFigureOut">
               <a:rPr lang="de-DE" smtClean="0"/>
-              <a:t>14.06.2024</a:t>
+              <a:t>13.09.2024</a:t>
             </a:fld>
             <a:endParaRPr lang="de-DE"/>
           </a:p>
@@ -2177,7 +2177,7 @@
           <a:p>
             <a:fld id="{77B9AAF2-2243-4209-A85C-F7036AF186DC}" type="datetimeFigureOut">
               <a:rPr lang="de-DE" smtClean="0"/>
-              <a:t>14.06.2024</a:t>
+              <a:t>13.09.2024</a:t>
             </a:fld>
             <a:endParaRPr lang="de-DE"/>
           </a:p>
@@ -2628,7 +2628,7 @@
           <a:p>
             <a:fld id="{77B9AAF2-2243-4209-A85C-F7036AF186DC}" type="datetimeFigureOut">
               <a:rPr lang="de-DE" smtClean="0"/>
-              <a:t>14.06.2024</a:t>
+              <a:t>13.09.2024</a:t>
             </a:fld>
             <a:endParaRPr lang="de-DE"/>
           </a:p>
@@ -2801,7 +2801,7 @@
           <a:p>
             <a:fld id="{77B9AAF2-2243-4209-A85C-F7036AF186DC}" type="datetimeFigureOut">
               <a:rPr lang="de-DE" smtClean="0"/>
-              <a:t>14.06.2024</a:t>
+              <a:t>13.09.2024</a:t>
             </a:fld>
             <a:endParaRPr lang="de-DE"/>
           </a:p>
@@ -3175,7 +3175,7 @@
           <a:p>
             <a:fld id="{77B9AAF2-2243-4209-A85C-F7036AF186DC}" type="datetimeFigureOut">
               <a:rPr lang="de-DE" smtClean="0"/>
-              <a:t>14.06.2024</a:t>
+              <a:t>13.09.2024</a:t>
             </a:fld>
             <a:endParaRPr lang="de-DE"/>
           </a:p>
@@ -3496,7 +3496,7 @@
           <a:p>
             <a:fld id="{77B9AAF2-2243-4209-A85C-F7036AF186DC}" type="datetimeFigureOut">
               <a:rPr lang="de-DE" smtClean="0"/>
-              <a:t>14.06.2024</a:t>
+              <a:t>13.09.2024</a:t>
             </a:fld>
             <a:endParaRPr lang="de-DE"/>
           </a:p>
@@ -4549,7 +4549,7 @@
         <p:spPr>
           <a:xfrm>
             <a:off x="1314628" y="456623"/>
-            <a:ext cx="9283883" cy="5966762"/>
+            <a:ext cx="9283883" cy="5582041"/>
           </a:xfrm>
           <a:prstGeom prst="rect">
             <a:avLst/>
@@ -4689,27 +4689,8 @@
                 <a:ea typeface="Milo-Medium"/>
                 <a:cs typeface="Source Sans Pro"/>
               </a:rPr>
-              <a:t>Using Rocky </a:t>
-            </a:r>
-            <a:r>
-              <a:rPr lang="en-GB" sz="2400">
-                <a:solidFill>
-                  <a:srgbClr val="60737F"/>
-                </a:solidFill>
-                <a:latin typeface="Source Sans Pro"/>
-                <a:ea typeface="Milo-Medium"/>
-                <a:cs typeface="Source Sans Pro"/>
-              </a:rPr>
-              <a:t>Linux 9.4</a:t>
-            </a:r>
-            <a:endParaRPr lang="en-GB" sz="2400" dirty="0">
-              <a:solidFill>
-                <a:srgbClr val="60737F"/>
-              </a:solidFill>
-              <a:latin typeface="Source Sans Pro"/>
-              <a:ea typeface="Milo-Medium"/>
-              <a:cs typeface="Source Sans Pro"/>
-            </a:endParaRPr>
+              <a:t>Using Rocky Linux 9.4.1</a:t>
+            </a:r>
           </a:p>
           <a:p>
             <a:pPr marL="800100" lvl="1" indent="-342900" eaLnBrk="0" hangingPunct="0">
@@ -4760,33 +4741,7 @@
                 <a:ea typeface="Milo-Medium"/>
                 <a:cs typeface="Source Sans Pro"/>
               </a:rPr>
-              <a:t>Easy installation from Rocky distribution images</a:t>
-            </a:r>
-          </a:p>
-          <a:p>
-            <a:pPr marL="800100" lvl="1" indent="-342900" eaLnBrk="0" hangingPunct="0">
-              <a:spcBef>
-                <a:spcPts val="600"/>
-              </a:spcBef>
-              <a:buClr>
-                <a:srgbClr val="C7DE37"/>
-              </a:buClr>
-              <a:buFont typeface="Arial" panose="020B0604020202020204" pitchFamily="34" charset="0"/>
-              <a:buChar char="•"/>
-              <a:tabLst>
-                <a:tab pos="392682" algn="l"/>
-              </a:tabLst>
-            </a:pPr>
-            <a:r>
-              <a:rPr lang="en-GB" sz="2000" dirty="0">
-                <a:solidFill>
-                  <a:srgbClr val="60737F"/>
-                </a:solidFill>
-                <a:latin typeface="Source Sans Pro"/>
-                <a:ea typeface="Milo-Medium"/>
-                <a:cs typeface="Source Sans Pro"/>
-              </a:rPr>
-              <a:t>Training-VM could be extended to also work on Debian-based distros</a:t>
+              <a:t>Training-VM will be extended to also work on Debian-based distros</a:t>
             </a:r>
           </a:p>
           <a:p>
@@ -5171,15 +5126,33 @@
                                   </p:childTnLst>
                                 </p:cTn>
                               </p:par>
+                            </p:childTnLst>
+                          </p:cTn>
+                        </p:par>
+                      </p:childTnLst>
+                    </p:cTn>
+                  </p:par>
+                  <p:par>
+                    <p:cTn id="19" fill="hold">
+                      <p:stCondLst>
+                        <p:cond delay="indefinite"/>
+                      </p:stCondLst>
+                      <p:childTnLst>
+                        <p:par>
+                          <p:cTn id="20" fill="hold">
+                            <p:stCondLst>
+                              <p:cond delay="0"/>
+                            </p:stCondLst>
+                            <p:childTnLst>
                               <p:par>
-                                <p:cTn id="19" presetID="1" presetClass="entr" presetSubtype="0" fill="hold" nodeType="withEffect">
+                                <p:cTn id="21" presetID="1" presetClass="entr" presetSubtype="0" fill="hold" nodeType="clickEffect">
                                   <p:stCondLst>
                                     <p:cond delay="0"/>
                                   </p:stCondLst>
                                   <p:childTnLst>
                                     <p:set>
                                       <p:cBhvr>
-                                        <p:cTn id="20" dur="1" fill="hold">
+                                        <p:cTn id="22" dur="1" fill="hold">
                                           <p:stCondLst>
                                             <p:cond delay="0"/>
                                           </p:stCondLst>
@@ -5202,26 +5175,8 @@
                                   </p:childTnLst>
                                 </p:cTn>
                               </p:par>
-                            </p:childTnLst>
-                          </p:cTn>
-                        </p:par>
-                      </p:childTnLst>
-                    </p:cTn>
-                  </p:par>
-                  <p:par>
-                    <p:cTn id="21" fill="hold">
-                      <p:stCondLst>
-                        <p:cond delay="indefinite"/>
-                      </p:stCondLst>
-                      <p:childTnLst>
-                        <p:par>
-                          <p:cTn id="22" fill="hold">
-                            <p:stCondLst>
-                              <p:cond delay="0"/>
-                            </p:stCondLst>
-                            <p:childTnLst>
                               <p:par>
-                                <p:cTn id="23" presetID="1" presetClass="entr" presetSubtype="0" fill="hold" nodeType="clickEffect">
+                                <p:cTn id="23" presetID="1" presetClass="entr" presetSubtype="0" fill="hold" nodeType="withEffect">
                                   <p:stCondLst>
                                     <p:cond delay="0"/>
                                   </p:stCondLst>
@@ -5251,15 +5206,33 @@
                                   </p:childTnLst>
                                 </p:cTn>
                               </p:par>
+                            </p:childTnLst>
+                          </p:cTn>
+                        </p:par>
+                      </p:childTnLst>
+                    </p:cTn>
+                  </p:par>
+                  <p:par>
+                    <p:cTn id="25" fill="hold">
+                      <p:stCondLst>
+                        <p:cond delay="indefinite"/>
+                      </p:stCondLst>
+                      <p:childTnLst>
+                        <p:par>
+                          <p:cTn id="26" fill="hold">
+                            <p:stCondLst>
+                              <p:cond delay="0"/>
+                            </p:stCondLst>
+                            <p:childTnLst>
                               <p:par>
-                                <p:cTn id="25" presetID="1" presetClass="entr" presetSubtype="0" fill="hold" nodeType="withEffect">
+                                <p:cTn id="27" presetID="1" presetClass="entr" presetSubtype="0" fill="hold" nodeType="clickEffect">
                                   <p:stCondLst>
                                     <p:cond delay="0"/>
                                   </p:stCondLst>
                                   <p:childTnLst>
                                     <p:set>
                                       <p:cBhvr>
-                                        <p:cTn id="26" dur="1" fill="hold">
+                                        <p:cTn id="28" dur="1" fill="hold">
                                           <p:stCondLst>
                                             <p:cond delay="0"/>
                                           </p:stCondLst>
@@ -5282,26 +5255,8 @@
                                   </p:childTnLst>
                                 </p:cTn>
                               </p:par>
-                            </p:childTnLst>
-                          </p:cTn>
-                        </p:par>
-                      </p:childTnLst>
-                    </p:cTn>
-                  </p:par>
-                  <p:par>
-                    <p:cTn id="27" fill="hold">
-                      <p:stCondLst>
-                        <p:cond delay="indefinite"/>
-                      </p:stCondLst>
-                      <p:childTnLst>
-                        <p:par>
-                          <p:cTn id="28" fill="hold">
-                            <p:stCondLst>
-                              <p:cond delay="0"/>
-                            </p:stCondLst>
-                            <p:childTnLst>
                               <p:par>
-                                <p:cTn id="29" presetID="1" presetClass="entr" presetSubtype="0" fill="hold" nodeType="clickEffect">
+                                <p:cTn id="29" presetID="1" presetClass="entr" presetSubtype="0" fill="hold" nodeType="withEffect">
                                   <p:stCondLst>
                                     <p:cond delay="0"/>
                                   </p:stCondLst>
@@ -5317,37 +5272,6 @@
                                           <p:spTgt spid="2">
                                             <p:txEl>
                                               <p:pRg st="10" end="10"/>
-                                            </p:txEl>
-                                          </p:spTgt>
-                                        </p:tgtEl>
-                                        <p:attrNameLst>
-                                          <p:attrName>style.visibility</p:attrName>
-                                        </p:attrNameLst>
-                                      </p:cBhvr>
-                                      <p:to>
-                                        <p:strVal val="visible"/>
-                                      </p:to>
-                                    </p:set>
-                                  </p:childTnLst>
-                                </p:cTn>
-                              </p:par>
-                              <p:par>
-                                <p:cTn id="31" presetID="1" presetClass="entr" presetSubtype="0" fill="hold" nodeType="withEffect">
-                                  <p:stCondLst>
-                                    <p:cond delay="0"/>
-                                  </p:stCondLst>
-                                  <p:childTnLst>
-                                    <p:set>
-                                      <p:cBhvr>
-                                        <p:cTn id="32" dur="1" fill="hold">
-                                          <p:stCondLst>
-                                            <p:cond delay="0"/>
-                                          </p:stCondLst>
-                                        </p:cTn>
-                                        <p:tgtEl>
-                                          <p:spTgt spid="2">
-                                            <p:txEl>
-                                              <p:pRg st="11" end="11"/>
                                             </p:txEl>
                                           </p:spTgt>
                                         </p:tgtEl>
@@ -6582,7 +6506,7 @@
                 <a:ea typeface="Source Sans Pro" panose="020B0503030403020204" pitchFamily="34" charset="0"/>
                 <a:cs typeface="Source Sans Pro"/>
               </a:rPr>
-              <a:t>Containerized setup for the </a:t>
+              <a:t>Containerized setup for the BESSY/HZB </a:t>
             </a:r>
             <a:r>
               <a:rPr lang="en-GB" sz="2000" dirty="0" err="1">
@@ -6925,7 +6849,7 @@
         <p:spPr>
           <a:xfrm>
             <a:off x="1314628" y="456623"/>
-            <a:ext cx="9283883" cy="3012107"/>
+            <a:ext cx="9283883" cy="4689489"/>
           </a:xfrm>
           <a:prstGeom prst="rect">
             <a:avLst/>
@@ -6987,6 +6911,105 @@
                 <a:ea typeface="Milo-Medium"/>
                 <a:cs typeface="Source Sans Pro"/>
               </a:rPr>
+              <a:t>The slug (short name) of the training event is kept in</a:t>
+            </a:r>
+            <a:br>
+              <a:rPr lang="en-GB" sz="1800" dirty="0">
+                <a:solidFill>
+                  <a:srgbClr val="60737F"/>
+                </a:solidFill>
+                <a:latin typeface="Source Sans Pro"/>
+                <a:ea typeface="Milo-Medium"/>
+                <a:cs typeface="Source Sans Pro"/>
+              </a:rPr>
+            </a:br>
+            <a:r>
+              <a:rPr lang="en-GB" sz="2000" dirty="0">
+                <a:solidFill>
+                  <a:srgbClr val="60737F"/>
+                </a:solidFill>
+                <a:latin typeface="Lucida Console" panose="020B0609040504020204" pitchFamily="49" charset="0"/>
+                <a:ea typeface="Milo-Medium"/>
+                <a:cs typeface="Source Sans Pro"/>
+              </a:rPr>
+              <a:t>/etc/epics-training</a:t>
+            </a:r>
+          </a:p>
+          <a:p>
+            <a:pPr marL="800100" lvl="1" indent="-342900" eaLnBrk="0" hangingPunct="0">
+              <a:spcBef>
+                <a:spcPts val="1000"/>
+              </a:spcBef>
+              <a:buClr>
+                <a:srgbClr val="C7DE37"/>
+              </a:buClr>
+              <a:buFont typeface="Arial" panose="020B0604020202020204" pitchFamily="34" charset="0"/>
+              <a:buChar char="•"/>
+              <a:tabLst>
+                <a:tab pos="392682" algn="l"/>
+              </a:tabLst>
+            </a:pPr>
+            <a:r>
+              <a:rPr lang="en-GB" sz="2000" dirty="0">
+                <a:solidFill>
+                  <a:srgbClr val="60737F"/>
+                </a:solidFill>
+                <a:latin typeface="Source Sans Pro" panose="020B0503030403020204" pitchFamily="34" charset="0"/>
+                <a:ea typeface="Source Sans Pro" panose="020B0503030403020204" pitchFamily="34" charset="0"/>
+                <a:cs typeface="Source Sans Pro"/>
+              </a:rPr>
+              <a:t>Corresponds to a branch name in the training-collection repository</a:t>
+            </a:r>
+          </a:p>
+          <a:p>
+            <a:pPr marL="800100" lvl="1" indent="-342900" eaLnBrk="0" hangingPunct="0">
+              <a:spcBef>
+                <a:spcPts val="1000"/>
+              </a:spcBef>
+              <a:buClr>
+                <a:srgbClr val="C7DE37"/>
+              </a:buClr>
+              <a:buFont typeface="Arial" panose="020B0604020202020204" pitchFamily="34" charset="0"/>
+              <a:buChar char="•"/>
+              <a:tabLst>
+                <a:tab pos="392682" algn="l"/>
+              </a:tabLst>
+            </a:pPr>
+            <a:r>
+              <a:rPr lang="en-GB" sz="2000" dirty="0">
+                <a:solidFill>
+                  <a:srgbClr val="60737F"/>
+                </a:solidFill>
+                <a:latin typeface="Source Sans Pro" panose="020B0503030403020204" pitchFamily="34" charset="0"/>
+                <a:ea typeface="Source Sans Pro" panose="020B0503030403020204" pitchFamily="34" charset="0"/>
+                <a:cs typeface="Source Sans Pro"/>
+              </a:rPr>
+              <a:t>This training is called ‘2024-fall-oakridge’</a:t>
+            </a:r>
+          </a:p>
+          <a:p>
+            <a:pPr marL="342900" indent="-342900" eaLnBrk="0" hangingPunct="0">
+              <a:spcBef>
+                <a:spcPts val="1000"/>
+              </a:spcBef>
+              <a:buClr>
+                <a:srgbClr val="C7DE37"/>
+              </a:buClr>
+              <a:buFont typeface="Arial" panose="020B0604020202020204" pitchFamily="34" charset="0"/>
+              <a:buChar char="•"/>
+              <a:tabLst>
+                <a:tab pos="392682" algn="l"/>
+              </a:tabLst>
+            </a:pPr>
+            <a:r>
+              <a:rPr lang="en-GB" sz="2400" dirty="0">
+                <a:solidFill>
+                  <a:srgbClr val="60737F"/>
+                </a:solidFill>
+                <a:latin typeface="Source Sans Pro"/>
+                <a:ea typeface="Milo-Medium"/>
+                <a:cs typeface="Source Sans Pro"/>
+              </a:rPr>
               <a:t>The central configuration file is</a:t>
             </a:r>
             <a:br>
@@ -7155,14 +7178,6 @@
               </a:rPr>
               <a:t>Define the settings for a corporate firewall (if you need to)</a:t>
             </a:r>
-            <a:endParaRPr lang="en-GB" dirty="0">
-              <a:solidFill>
-                <a:srgbClr val="60737F"/>
-              </a:solidFill>
-              <a:latin typeface="Lucida Console" panose="020B0609040504020204" pitchFamily="49" charset="0"/>
-              <a:ea typeface="Source Sans Pro" panose="020B0503030403020204" pitchFamily="34" charset="0"/>
-              <a:cs typeface="Source Sans Pro"/>
-            </a:endParaRPr>
           </a:p>
         </p:txBody>
       </p:sp>
@@ -7205,7 +7220,7 @@
         <p:spPr>
           <a:xfrm>
             <a:off x="1314628" y="456623"/>
-            <a:ext cx="9283883" cy="4863896"/>
+            <a:ext cx="9283883" cy="4340675"/>
           </a:xfrm>
           <a:prstGeom prst="rect">
             <a:avLst/>
@@ -7479,7 +7494,7 @@
               </a:rPr>
             </a:br>
             <a:r>
-              <a:rPr lang="en-GB" dirty="0">
+              <a:rPr lang="en-GB" sz="1400" dirty="0">
                 <a:solidFill>
                   <a:srgbClr val="60737F"/>
                 </a:solidFill>
@@ -7490,7 +7505,7 @@
               <a:t>$ cd &lt;TOP&gt;</a:t>
             </a:r>
             <a:br>
-              <a:rPr lang="en-GB" dirty="0">
+              <a:rPr lang="en-GB" sz="1400" dirty="0">
                 <a:solidFill>
                   <a:srgbClr val="60737F"/>
                 </a:solidFill>
@@ -7500,7 +7515,7 @@
               </a:rPr>
             </a:br>
             <a:r>
-              <a:rPr lang="en-GB" dirty="0">
+              <a:rPr lang="en-GB" sz="1400" dirty="0">
                 <a:solidFill>
                   <a:srgbClr val="60737F"/>
                 </a:solidFill>
@@ -7547,7 +7562,7 @@
               </a:rPr>
             </a:br>
             <a:r>
-              <a:rPr lang="en-GB" dirty="0">
+              <a:rPr lang="en-GB" sz="1400" dirty="0">
                 <a:solidFill>
                   <a:srgbClr val="60737F"/>
                 </a:solidFill>
@@ -7558,7 +7573,7 @@
               <a:t>$ cd &lt;TOP&gt;</a:t>
             </a:r>
             <a:br>
-              <a:rPr lang="en-GB" dirty="0">
+              <a:rPr lang="en-GB" sz="1400" dirty="0">
                 <a:solidFill>
                   <a:srgbClr val="60737F"/>
                 </a:solidFill>
@@ -7568,7 +7583,7 @@
               </a:rPr>
             </a:br>
             <a:r>
-              <a:rPr lang="en-GB" dirty="0">
+              <a:rPr lang="en-GB" sz="1400" dirty="0">
                 <a:solidFill>
                   <a:srgbClr val="60737F"/>
                 </a:solidFill>
@@ -7579,7 +7594,7 @@
               <a:t>$ ( cd </a:t>
             </a:r>
             <a:r>
-              <a:rPr lang="en-GB" dirty="0" err="1">
+              <a:rPr lang="en-GB" sz="1400" dirty="0" err="1">
                 <a:solidFill>
                   <a:srgbClr val="60737F"/>
                 </a:solidFill>
@@ -7590,7 +7605,7 @@
               <a:t>iocBoot</a:t>
             </a:r>
             <a:r>
-              <a:rPr lang="en-GB" dirty="0">
+              <a:rPr lang="en-GB" sz="1400" dirty="0">
                 <a:solidFill>
                   <a:srgbClr val="60737F"/>
                 </a:solidFill>
@@ -7601,7 +7616,7 @@
               <a:t>/</a:t>
             </a:r>
             <a:r>
-              <a:rPr lang="en-GB" dirty="0" err="1">
+              <a:rPr lang="en-GB" sz="1400" dirty="0" err="1">
                 <a:solidFill>
                   <a:srgbClr val="60737F"/>
                 </a:solidFill>
@@ -7612,7 +7627,7 @@
               <a:t>ioc</a:t>
             </a:r>
             <a:r>
-              <a:rPr lang="en-GB" dirty="0">
+              <a:rPr lang="en-GB" sz="1400" dirty="0">
                 <a:solidFill>
                   <a:srgbClr val="60737F"/>
                 </a:solidFill>
@@ -7623,7 +7638,7 @@
               <a:t>&lt;</a:t>
             </a:r>
             <a:r>
-              <a:rPr lang="en-GB" dirty="0" err="1">
+              <a:rPr lang="en-GB" sz="1400" dirty="0" err="1">
                 <a:solidFill>
                   <a:srgbClr val="60737F"/>
                 </a:solidFill>
@@ -7634,7 +7649,7 @@
               <a:t>ioc</a:t>
             </a:r>
             <a:r>
-              <a:rPr lang="en-GB" dirty="0">
+              <a:rPr lang="en-GB" sz="1400" dirty="0">
                 <a:solidFill>
                   <a:srgbClr val="60737F"/>
                 </a:solidFill>
@@ -7642,10 +7657,10 @@
                 <a:ea typeface="Source Sans Pro" panose="020B0503030403020204" pitchFamily="34" charset="0"/>
                 <a:cs typeface="Source Sans Pro"/>
               </a:rPr>
-              <a:t>-name&gt;; \</a:t>
-            </a:r>
-            <a:br>
-              <a:rPr lang="en-GB" dirty="0">
+              <a:t>-name&gt;; ../../bin/linux-x86_64/&lt;</a:t>
+            </a:r>
+            <a:r>
+              <a:rPr lang="en-GB" sz="1400" dirty="0" err="1">
                 <a:solidFill>
                   <a:srgbClr val="60737F"/>
                 </a:solidFill>
@@ -7653,31 +7668,10 @@
                 <a:ea typeface="Source Sans Pro" panose="020B0503030403020204" pitchFamily="34" charset="0"/>
                 <a:cs typeface="Source Sans Pro"/>
               </a:rPr>
-            </a:br>
-            <a:r>
-              <a:rPr lang="en-GB" dirty="0">
-                <a:solidFill>
-                  <a:srgbClr val="60737F"/>
-                </a:solidFill>
-                <a:latin typeface="Lucida Console" panose="020B0609040504020204" pitchFamily="49" charset="0"/>
-                <a:ea typeface="Source Sans Pro" panose="020B0503030403020204" pitchFamily="34" charset="0"/>
-                <a:cs typeface="Source Sans Pro"/>
-              </a:rPr>
-              <a:t>../../bin/linux-x86_64/&lt;</a:t>
-            </a:r>
-            <a:r>
-              <a:rPr lang="en-GB" dirty="0" err="1">
-                <a:solidFill>
-                  <a:srgbClr val="60737F"/>
-                </a:solidFill>
-                <a:latin typeface="Lucida Console" panose="020B0609040504020204" pitchFamily="49" charset="0"/>
-                <a:ea typeface="Source Sans Pro" panose="020B0503030403020204" pitchFamily="34" charset="0"/>
-                <a:cs typeface="Source Sans Pro"/>
-              </a:rPr>
               <a:t>IOCbinary</a:t>
             </a:r>
             <a:r>
-              <a:rPr lang="en-GB" dirty="0">
+              <a:rPr lang="en-GB" sz="1400" dirty="0">
                 <a:solidFill>
                   <a:srgbClr val="60737F"/>
                 </a:solidFill>
@@ -8095,7 +8089,7 @@
                 <a:ea typeface="Milo-Medium"/>
                 <a:cs typeface="Source Sans Pro"/>
               </a:rPr>
-              <a:t>Call it (best from the </a:t>
+              <a:t>Call it from the </a:t>
             </a:r>
             <a:r>
               <a:rPr lang="en-GB" sz="2000" dirty="0">
@@ -8117,7 +8111,40 @@
                 <a:ea typeface="Milo-Medium"/>
                 <a:cs typeface="Source Sans Pro"/>
               </a:rPr>
-              <a:t> directory) to:</a:t>
+              <a:t> directory as </a:t>
+            </a:r>
+            <a:r>
+              <a:rPr lang="en-GB" sz="2000" dirty="0">
+                <a:solidFill>
+                  <a:srgbClr val="60737F"/>
+                </a:solidFill>
+                <a:latin typeface="Lucida Console" panose="020B0609040504020204" pitchFamily="49" charset="0"/>
+                <a:ea typeface="Milo-Medium"/>
+                <a:cs typeface="Source Sans Pro"/>
+              </a:rPr>
+              <a:t>./vm-setup/update.sh</a:t>
+            </a:r>
+            <a:r>
+              <a:rPr lang="en-GB" sz="2000" dirty="0">
+                <a:solidFill>
+                  <a:srgbClr val="60737F"/>
+                </a:solidFill>
+                <a:latin typeface="Source Sans Pro"/>
+                <a:ea typeface="Milo-Medium"/>
+                <a:cs typeface="Source Sans Pro"/>
+              </a:rPr>
+              <a:t> </a:t>
+            </a:r>
+            <a:r>
+              <a:rPr lang="en-GB" sz="2400" dirty="0">
+                <a:solidFill>
+                  <a:srgbClr val="60737F"/>
+                </a:solidFill>
+                <a:latin typeface="Source Sans Pro"/>
+                <a:ea typeface="Milo-Medium"/>
+                <a:cs typeface="Source Sans Pro"/>
+              </a:rPr>
+              <a:t>to:</a:t>
             </a:r>
           </a:p>
           <a:p>
@@ -8430,7 +8457,7 @@
               </a:rPr>
             </a:br>
             <a:r>
-              <a:rPr lang="en-GB" sz="2000" dirty="0">
+              <a:rPr lang="en-GB" dirty="0">
                 <a:solidFill>
                   <a:srgbClr val="60737F"/>
                 </a:solidFill>

</xml_diff>

<commit_message>
Presentation updates for 2025-spring-harwell
</commit_message>
<xml_diff>
--- a/presentations/EPICS Training VM.pptx
+++ b/presentations/EPICS Training VM.pptx
@@ -250,7 +250,7 @@
           <a:p>
             <a:fld id="{E00E58FE-3AE1-4995-80E6-8AF0F1DA0E4E}" type="datetimeFigureOut">
               <a:rPr lang="de-DE" smtClean="0"/>
-              <a:t>13.09.2024</a:t>
+              <a:t>10.04.2025</a:t>
             </a:fld>
             <a:endParaRPr lang="de-DE"/>
           </a:p>
@@ -427,7 +427,7 @@
           <a:p>
             <a:fld id="{45091381-FB9B-4B1C-99E3-890DFD4525D3}" type="datetimeFigureOut">
               <a:rPr lang="de-DE" smtClean="0"/>
-              <a:t>13.09.2024</a:t>
+              <a:t>10.04.2025</a:t>
             </a:fld>
             <a:endParaRPr lang="de-DE"/>
           </a:p>
@@ -855,7 +855,7 @@
           <a:p>
             <a:fld id="{77B9AAF2-2243-4209-A85C-F7036AF186DC}" type="datetimeFigureOut">
               <a:rPr lang="de-DE" smtClean="0"/>
-              <a:t>13.09.2024</a:t>
+              <a:t>10.04.2025</a:t>
             </a:fld>
             <a:endParaRPr lang="de-DE"/>
           </a:p>
@@ -1093,7 +1093,7 @@
           <a:p>
             <a:fld id="{77B9AAF2-2243-4209-A85C-F7036AF186DC}" type="datetimeFigureOut">
               <a:rPr lang="de-DE" smtClean="0"/>
-              <a:t>13.09.2024</a:t>
+              <a:t>10.04.2025</a:t>
             </a:fld>
             <a:endParaRPr lang="de-DE"/>
           </a:p>
@@ -1331,7 +1331,7 @@
           <a:p>
             <a:fld id="{77B9AAF2-2243-4209-A85C-F7036AF186DC}" type="datetimeFigureOut">
               <a:rPr lang="de-DE" smtClean="0"/>
-              <a:t>13.09.2024</a:t>
+              <a:t>10.04.2025</a:t>
             </a:fld>
             <a:endParaRPr lang="de-DE"/>
           </a:p>
@@ -1569,7 +1569,7 @@
           <a:p>
             <a:fld id="{77B9AAF2-2243-4209-A85C-F7036AF186DC}" type="datetimeFigureOut">
               <a:rPr lang="de-DE" smtClean="0"/>
-              <a:t>13.09.2024</a:t>
+              <a:t>10.04.2025</a:t>
             </a:fld>
             <a:endParaRPr lang="de-DE"/>
           </a:p>
@@ -1874,7 +1874,7 @@
           <a:p>
             <a:fld id="{77B9AAF2-2243-4209-A85C-F7036AF186DC}" type="datetimeFigureOut">
               <a:rPr lang="de-DE" smtClean="0"/>
-              <a:t>13.09.2024</a:t>
+              <a:t>10.04.2025</a:t>
             </a:fld>
             <a:endParaRPr lang="de-DE"/>
           </a:p>
@@ -2177,7 +2177,7 @@
           <a:p>
             <a:fld id="{77B9AAF2-2243-4209-A85C-F7036AF186DC}" type="datetimeFigureOut">
               <a:rPr lang="de-DE" smtClean="0"/>
-              <a:t>13.09.2024</a:t>
+              <a:t>10.04.2025</a:t>
             </a:fld>
             <a:endParaRPr lang="de-DE"/>
           </a:p>
@@ -2628,7 +2628,7 @@
           <a:p>
             <a:fld id="{77B9AAF2-2243-4209-A85C-F7036AF186DC}" type="datetimeFigureOut">
               <a:rPr lang="de-DE" smtClean="0"/>
-              <a:t>13.09.2024</a:t>
+              <a:t>10.04.2025</a:t>
             </a:fld>
             <a:endParaRPr lang="de-DE"/>
           </a:p>
@@ -2801,7 +2801,7 @@
           <a:p>
             <a:fld id="{77B9AAF2-2243-4209-A85C-F7036AF186DC}" type="datetimeFigureOut">
               <a:rPr lang="de-DE" smtClean="0"/>
-              <a:t>13.09.2024</a:t>
+              <a:t>10.04.2025</a:t>
             </a:fld>
             <a:endParaRPr lang="de-DE"/>
           </a:p>
@@ -3175,7 +3175,7 @@
           <a:p>
             <a:fld id="{77B9AAF2-2243-4209-A85C-F7036AF186DC}" type="datetimeFigureOut">
               <a:rPr lang="de-DE" smtClean="0"/>
-              <a:t>13.09.2024</a:t>
+              <a:t>10.04.2025</a:t>
             </a:fld>
             <a:endParaRPr lang="de-DE"/>
           </a:p>
@@ -3496,7 +3496,7 @@
           <a:p>
             <a:fld id="{77B9AAF2-2243-4209-A85C-F7036AF186DC}" type="datetimeFigureOut">
               <a:rPr lang="de-DE" smtClean="0"/>
-              <a:t>13.09.2024</a:t>
+              <a:t>10.04.2025</a:t>
             </a:fld>
             <a:endParaRPr lang="de-DE"/>
           </a:p>
@@ -4319,7 +4319,7 @@
                 <a:ea typeface="Milo-Medium"/>
                 <a:cs typeface="Source Sans Pro"/>
               </a:rPr>
-              <a:t>Runs on may host platforms (Linux, Windows, old Macs)</a:t>
+              <a:t>Runs on may host platforms (Linux, Windows, MacOS)</a:t>
             </a:r>
           </a:p>
           <a:p>
@@ -4494,7 +4494,7 @@
                 <a:ea typeface="Milo-Medium"/>
                 <a:cs typeface="Source Sans Pro"/>
               </a:rPr>
-              <a:t>yaml</a:t>
+              <a:t>yml</a:t>
             </a:r>
             <a:r>
               <a:rPr lang="en-GB" sz="2000" dirty="0">
@@ -4505,7 +4505,7 @@
                 <a:ea typeface="Milo-Medium"/>
                 <a:cs typeface="Source Sans Pro"/>
               </a:rPr>
-              <a:t>) under Git management</a:t>
+              <a:t>) under public Git management</a:t>
             </a:r>
           </a:p>
         </p:txBody>
@@ -4611,7 +4611,7 @@
                 <a:ea typeface="Milo-Medium"/>
                 <a:cs typeface="Source Sans Pro"/>
               </a:rPr>
-              <a:t>Based on Oracle VirtualBox (7.0)</a:t>
+              <a:t>Based on Oracle VirtualBox (7.1), scripted with Vagrant</a:t>
             </a:r>
           </a:p>
           <a:p>
@@ -4637,7 +4637,7 @@
                 <a:ea typeface="Milo-Medium"/>
                 <a:cs typeface="Source Sans Pro"/>
               </a:rPr>
-              <a:t>Freely available virtualization platform</a:t>
+              <a:t>Freely available virtualization platform, good experiences</a:t>
             </a:r>
           </a:p>
           <a:p>
@@ -4663,7 +4663,7 @@
                 <a:ea typeface="Milo-Medium"/>
                 <a:cs typeface="Source Sans Pro"/>
               </a:rPr>
-              <a:t>Good experiences at many labs</a:t>
+              <a:t>Created using Vagrant: fast and scripted</a:t>
             </a:r>
           </a:p>
           <a:p>
@@ -4689,7 +4689,7 @@
                 <a:ea typeface="Milo-Medium"/>
                 <a:cs typeface="Source Sans Pro"/>
               </a:rPr>
-              <a:t>Using Rocky Linux 9.4.1</a:t>
+              <a:t>Four Linux flavours</a:t>
             </a:r>
           </a:p>
           <a:p>
@@ -4715,7 +4715,44 @@
                 <a:ea typeface="Milo-Medium"/>
                 <a:cs typeface="Source Sans Pro"/>
               </a:rPr>
-              <a:t>Best knowledge and most existing Ansible code is based on RHEL</a:t>
+              <a:t>Two RedHat, two Debian derivatives: </a:t>
+            </a:r>
+            <a:r>
+              <a:rPr lang="en-GB" sz="2000" b="1" dirty="0">
+                <a:solidFill>
+                  <a:srgbClr val="60737F"/>
+                </a:solidFill>
+                <a:latin typeface="Source Sans Pro"/>
+                <a:ea typeface="Milo-Medium"/>
+                <a:cs typeface="Source Sans Pro"/>
+              </a:rPr>
+              <a:t>Rocky, Fedora, Debian, Ubuntu</a:t>
+            </a:r>
+          </a:p>
+          <a:p>
+            <a:pPr marL="342900" indent="-342900" eaLnBrk="0" hangingPunct="0">
+              <a:spcBef>
+                <a:spcPts val="1000"/>
+              </a:spcBef>
+              <a:buClr>
+                <a:srgbClr val="C7DE37"/>
+              </a:buClr>
+              <a:buFont typeface="Arial" panose="020B0604020202020204" pitchFamily="34" charset="0"/>
+              <a:buChar char="•"/>
+              <a:tabLst>
+                <a:tab pos="392682" algn="l"/>
+              </a:tabLst>
+            </a:pPr>
+            <a:r>
+              <a:rPr lang="en-GB" sz="2400" dirty="0">
+                <a:solidFill>
+                  <a:srgbClr val="60737F"/>
+                </a:solidFill>
+                <a:latin typeface="Source Sans Pro"/>
+                <a:ea typeface="Milo-Medium"/>
+                <a:cs typeface="Source Sans Pro"/>
+              </a:rPr>
+              <a:t>Generic “EPICS Developer” (epics-dev) User Account</a:t>
             </a:r>
           </a:p>
           <a:p>
@@ -4741,7 +4778,28 @@
                 <a:ea typeface="Milo-Medium"/>
                 <a:cs typeface="Source Sans Pro"/>
               </a:rPr>
-              <a:t>Training-VM will be extended to also work on Debian-based distros</a:t>
+              <a:t>Best practice:</a:t>
+            </a:r>
+            <a:br>
+              <a:rPr lang="en-GB" sz="2000" dirty="0">
+                <a:solidFill>
+                  <a:srgbClr val="60737F"/>
+                </a:solidFill>
+                <a:latin typeface="Source Sans Pro"/>
+                <a:ea typeface="Milo-Medium"/>
+                <a:cs typeface="Source Sans Pro"/>
+              </a:rPr>
+            </a:br>
+            <a:r>
+              <a:rPr lang="en-GB" sz="2000" dirty="0">
+                <a:solidFill>
+                  <a:srgbClr val="60737F"/>
+                </a:solidFill>
+                <a:latin typeface="Source Sans Pro"/>
+                <a:ea typeface="Milo-Medium"/>
+                <a:cs typeface="Source Sans Pro"/>
+              </a:rPr>
+              <a:t>Read-only shared installation, development under a regular user account</a:t>
             </a:r>
           </a:p>
           <a:p>
@@ -4767,7 +4825,7 @@
                 <a:ea typeface="Milo-Medium"/>
                 <a:cs typeface="Source Sans Pro"/>
               </a:rPr>
-              <a:t>Generic “EPICS Developer” (epics-dev) User Account</a:t>
+              <a:t>Personalize your VM!</a:t>
             </a:r>
           </a:p>
           <a:p>
@@ -4793,7 +4851,7 @@
                 <a:ea typeface="Milo-Medium"/>
                 <a:cs typeface="Source Sans Pro"/>
               </a:rPr>
-              <a:t>Best practice:</a:t>
+              <a:t>Make yourself comfortable:</a:t>
             </a:r>
             <a:br>
               <a:rPr lang="en-GB" sz="2000" dirty="0">
@@ -4814,33 +4872,7 @@
                 <a:ea typeface="Milo-Medium"/>
                 <a:cs typeface="Source Sans Pro"/>
               </a:rPr>
-              <a:t>Read-only shared installation, development under a regular user account</a:t>
-            </a:r>
-          </a:p>
-          <a:p>
-            <a:pPr marL="342900" indent="-342900" eaLnBrk="0" hangingPunct="0">
-              <a:spcBef>
-                <a:spcPts val="1000"/>
-              </a:spcBef>
-              <a:buClr>
-                <a:srgbClr val="C7DE37"/>
-              </a:buClr>
-              <a:buFont typeface="Arial" panose="020B0604020202020204" pitchFamily="34" charset="0"/>
-              <a:buChar char="•"/>
-              <a:tabLst>
-                <a:tab pos="392682" algn="l"/>
-              </a:tabLst>
-            </a:pPr>
-            <a:r>
-              <a:rPr lang="en-GB" sz="2400" dirty="0">
-                <a:solidFill>
-                  <a:srgbClr val="60737F"/>
-                </a:solidFill>
-                <a:latin typeface="Source Sans Pro"/>
-                <a:ea typeface="Milo-Medium"/>
-                <a:cs typeface="Source Sans Pro"/>
-              </a:rPr>
-              <a:t>Personalize your VM (or use your own)!</a:t>
+              <a:t>Create your own user, install your favourite IDE and tools, use your own VM</a:t>
             </a:r>
           </a:p>
           <a:p>
@@ -4866,28 +4898,7 @@
                 <a:ea typeface="Milo-Medium"/>
                 <a:cs typeface="Source Sans Pro"/>
               </a:rPr>
-              <a:t>Make yourself comfortable:</a:t>
-            </a:r>
-            <a:br>
-              <a:rPr lang="en-GB" sz="2000" dirty="0">
-                <a:solidFill>
-                  <a:srgbClr val="60737F"/>
-                </a:solidFill>
-                <a:latin typeface="Source Sans Pro"/>
-                <a:ea typeface="Milo-Medium"/>
-                <a:cs typeface="Source Sans Pro"/>
-              </a:rPr>
-            </a:br>
-            <a:r>
-              <a:rPr lang="en-GB" sz="2000" dirty="0">
-                <a:solidFill>
-                  <a:srgbClr val="60737F"/>
-                </a:solidFill>
-                <a:latin typeface="Source Sans Pro"/>
-                <a:ea typeface="Milo-Medium"/>
-                <a:cs typeface="Source Sans Pro"/>
-              </a:rPr>
-              <a:t>Create your own user, install your favourite IDE and tools, use your own VM</a:t>
+              <a:t>Can be used to provide portable systems for users, vendors, customers…</a:t>
             </a:r>
           </a:p>
         </p:txBody>
@@ -5095,15 +5106,33 @@
                                   </p:childTnLst>
                                 </p:cTn>
                               </p:par>
+                            </p:childTnLst>
+                          </p:cTn>
+                        </p:par>
+                      </p:childTnLst>
+                    </p:cTn>
+                  </p:par>
+                  <p:par>
+                    <p:cTn id="17" fill="hold">
+                      <p:stCondLst>
+                        <p:cond delay="indefinite"/>
+                      </p:stCondLst>
+                      <p:childTnLst>
+                        <p:par>
+                          <p:cTn id="18" fill="hold">
+                            <p:stCondLst>
+                              <p:cond delay="0"/>
+                            </p:stCondLst>
+                            <p:childTnLst>
                               <p:par>
-                                <p:cTn id="17" presetID="1" presetClass="entr" presetSubtype="0" fill="hold" nodeType="withEffect">
+                                <p:cTn id="19" presetID="1" presetClass="entr" presetSubtype="0" fill="hold" nodeType="clickEffect">
                                   <p:stCondLst>
                                     <p:cond delay="0"/>
                                   </p:stCondLst>
                                   <p:childTnLst>
                                     <p:set>
                                       <p:cBhvr>
-                                        <p:cTn id="18" dur="1" fill="hold">
+                                        <p:cTn id="20" dur="1" fill="hold">
                                           <p:stCondLst>
                                             <p:cond delay="0"/>
                                           </p:stCondLst>
@@ -5126,26 +5155,8 @@
                                   </p:childTnLst>
                                 </p:cTn>
                               </p:par>
-                            </p:childTnLst>
-                          </p:cTn>
-                        </p:par>
-                      </p:childTnLst>
-                    </p:cTn>
-                  </p:par>
-                  <p:par>
-                    <p:cTn id="19" fill="hold">
-                      <p:stCondLst>
-                        <p:cond delay="indefinite"/>
-                      </p:stCondLst>
-                      <p:childTnLst>
-                        <p:par>
-                          <p:cTn id="20" fill="hold">
-                            <p:stCondLst>
-                              <p:cond delay="0"/>
-                            </p:stCondLst>
-                            <p:childTnLst>
                               <p:par>
-                                <p:cTn id="21" presetID="1" presetClass="entr" presetSubtype="0" fill="hold" nodeType="clickEffect">
+                                <p:cTn id="21" presetID="1" presetClass="entr" presetSubtype="0" fill="hold" nodeType="withEffect">
                                   <p:stCondLst>
                                     <p:cond delay="0"/>
                                   </p:stCondLst>
@@ -5175,15 +5186,33 @@
                                   </p:childTnLst>
                                 </p:cTn>
                               </p:par>
+                            </p:childTnLst>
+                          </p:cTn>
+                        </p:par>
+                      </p:childTnLst>
+                    </p:cTn>
+                  </p:par>
+                  <p:par>
+                    <p:cTn id="23" fill="hold">
+                      <p:stCondLst>
+                        <p:cond delay="indefinite"/>
+                      </p:stCondLst>
+                      <p:childTnLst>
+                        <p:par>
+                          <p:cTn id="24" fill="hold">
+                            <p:stCondLst>
+                              <p:cond delay="0"/>
+                            </p:stCondLst>
+                            <p:childTnLst>
                               <p:par>
-                                <p:cTn id="23" presetID="1" presetClass="entr" presetSubtype="0" fill="hold" nodeType="withEffect">
+                                <p:cTn id="25" presetID="1" presetClass="entr" presetSubtype="0" fill="hold" nodeType="clickEffect">
                                   <p:stCondLst>
                                     <p:cond delay="0"/>
                                   </p:stCondLst>
                                   <p:childTnLst>
                                     <p:set>
                                       <p:cBhvr>
-                                        <p:cTn id="24" dur="1" fill="hold">
+                                        <p:cTn id="26" dur="1" fill="hold">
                                           <p:stCondLst>
                                             <p:cond delay="0"/>
                                           </p:stCondLst>
@@ -5206,26 +5235,8 @@
                                   </p:childTnLst>
                                 </p:cTn>
                               </p:par>
-                            </p:childTnLst>
-                          </p:cTn>
-                        </p:par>
-                      </p:childTnLst>
-                    </p:cTn>
-                  </p:par>
-                  <p:par>
-                    <p:cTn id="25" fill="hold">
-                      <p:stCondLst>
-                        <p:cond delay="indefinite"/>
-                      </p:stCondLst>
-                      <p:childTnLst>
-                        <p:par>
-                          <p:cTn id="26" fill="hold">
-                            <p:stCondLst>
-                              <p:cond delay="0"/>
-                            </p:stCondLst>
-                            <p:childTnLst>
                               <p:par>
-                                <p:cTn id="27" presetID="1" presetClass="entr" presetSubtype="0" fill="hold" nodeType="clickEffect">
+                                <p:cTn id="27" presetID="1" presetClass="entr" presetSubtype="0" fill="hold" nodeType="withEffect">
                                   <p:stCondLst>
                                     <p:cond delay="0"/>
                                   </p:stCondLst>
@@ -5483,7 +5494,7 @@
                 <a:ea typeface="Milo-Medium"/>
                 <a:cs typeface="Source Sans Pro"/>
               </a:rPr>
-              <a:t>Avoid unnecessary complexity (e.g., containers)</a:t>
+              <a:t>Avoid unnecessary complexity</a:t>
             </a:r>
           </a:p>
           <a:p>
@@ -5509,7 +5520,7 @@
                 <a:ea typeface="Milo-Medium"/>
                 <a:cs typeface="Source Sans Pro"/>
               </a:rPr>
-              <a:t>Show how a minimal EPICS set-up would look like</a:t>
+              <a:t>Show how a minimal EPICS set-up looks like</a:t>
             </a:r>
           </a:p>
           <a:p>
@@ -6115,8 +6126,8 @@
         </p:nvSpPr>
         <p:spPr>
           <a:xfrm>
-            <a:off x="1314628" y="456623"/>
-            <a:ext cx="9283883" cy="5166543"/>
+            <a:off x="1326985" y="456623"/>
+            <a:ext cx="9283883" cy="5243487"/>
           </a:xfrm>
           <a:prstGeom prst="rect">
             <a:avLst/>
@@ -6249,38 +6260,6 @@
               </a:rPr>
               <a:t>, …</a:t>
             </a:r>
-            <a:br>
-              <a:rPr lang="en-GB" sz="2000" dirty="0">
-                <a:solidFill>
-                  <a:srgbClr val="60737F"/>
-                </a:solidFill>
-                <a:latin typeface="Source Sans Pro"/>
-                <a:ea typeface="Milo-Medium"/>
-                <a:cs typeface="Source Sans Pro"/>
-              </a:rPr>
-            </a:br>
-            <a:r>
-              <a:rPr lang="en-GB" sz="2000" dirty="0">
-                <a:solidFill>
-                  <a:srgbClr val="60737F"/>
-                </a:solidFill>
-                <a:latin typeface="Source Sans Pro"/>
-                <a:ea typeface="Milo-Medium"/>
-                <a:cs typeface="Source Sans Pro"/>
-              </a:rPr>
-              <a:t>Under </a:t>
-            </a:r>
-            <a:r>
-              <a:rPr lang="en-GB" dirty="0">
-                <a:solidFill>
-                  <a:srgbClr val="60737F"/>
-                </a:solidFill>
-                <a:latin typeface="Lucida Console" panose="020B0609040504020204" pitchFamily="49" charset="0"/>
-                <a:ea typeface="Milo-Medium"/>
-                <a:cs typeface="Source Sans Pro"/>
-              </a:rPr>
-              <a:t>/opt/epics</a:t>
-            </a:r>
           </a:p>
           <a:p>
             <a:pPr marL="800100" lvl="1" indent="-342900" eaLnBrk="0" hangingPunct="0">
@@ -6326,7 +6305,7 @@
                 <a:ea typeface="Milo-Medium"/>
                 <a:cs typeface="Source Sans Pro"/>
               </a:rPr>
-              <a:t>Java 17, Maven: from installation downloads for a fixed and portable install</a:t>
+              <a:t>Java 17, Maven: from installation downloads</a:t>
             </a:r>
             <a:br>
               <a:rPr lang="en-GB" sz="2000" dirty="0">
@@ -6348,38 +6327,6 @@
                 <a:cs typeface="Source Sans Pro"/>
               </a:rPr>
               <a:t>Phoebus: from source</a:t>
-            </a:r>
-            <a:br>
-              <a:rPr lang="en-GB" sz="2000" dirty="0">
-                <a:solidFill>
-                  <a:srgbClr val="60737F"/>
-                </a:solidFill>
-                <a:latin typeface="Source Sans Pro"/>
-                <a:ea typeface="Milo-Medium"/>
-                <a:cs typeface="Source Sans Pro"/>
-              </a:rPr>
-            </a:br>
-            <a:r>
-              <a:rPr lang="en-GB" sz="2000" dirty="0">
-                <a:solidFill>
-                  <a:srgbClr val="60737F"/>
-                </a:solidFill>
-                <a:latin typeface="Source Sans Pro"/>
-                <a:ea typeface="Milo-Medium"/>
-                <a:cs typeface="Source Sans Pro"/>
-              </a:rPr>
-              <a:t>Under </a:t>
-            </a:r>
-            <a:r>
-              <a:rPr lang="en-GB" dirty="0">
-                <a:solidFill>
-                  <a:srgbClr val="60737F"/>
-                </a:solidFill>
-                <a:latin typeface="Lucida Console" panose="020B0609040504020204" pitchFamily="49" charset="0"/>
-                <a:ea typeface="Milo-Medium"/>
-                <a:cs typeface="Source Sans Pro"/>
-              </a:rPr>
-              <a:t>/opt/epics-tools</a:t>
             </a:r>
           </a:p>
           <a:p>
@@ -6506,29 +6453,7 @@
                 <a:ea typeface="Source Sans Pro" panose="020B0503030403020204" pitchFamily="34" charset="0"/>
                 <a:cs typeface="Source Sans Pro"/>
               </a:rPr>
-              <a:t>Containerized setup for the BESSY/HZB </a:t>
-            </a:r>
-            <a:r>
-              <a:rPr lang="en-GB" sz="2000" dirty="0" err="1">
-                <a:solidFill>
-                  <a:srgbClr val="60737F"/>
-                </a:solidFill>
-                <a:latin typeface="Source Sans Pro" panose="020B0503030403020204" pitchFamily="34" charset="0"/>
-                <a:ea typeface="Source Sans Pro" panose="020B0503030403020204" pitchFamily="34" charset="0"/>
-                <a:cs typeface="Source Sans Pro"/>
-              </a:rPr>
-              <a:t>Bluesky</a:t>
-            </a:r>
-            <a:r>
-              <a:rPr lang="en-GB" sz="2000" dirty="0">
-                <a:solidFill>
-                  <a:srgbClr val="60737F"/>
-                </a:solidFill>
-                <a:latin typeface="Source Sans Pro" panose="020B0503030403020204" pitchFamily="34" charset="0"/>
-                <a:ea typeface="Source Sans Pro" panose="020B0503030403020204" pitchFamily="34" charset="0"/>
-                <a:cs typeface="Source Sans Pro"/>
-              </a:rPr>
-              <a:t> training session</a:t>
+              <a:t>Containerized setup for the BESSY/HZB Bluesky training session</a:t>
             </a:r>
             <a:br>
               <a:rPr lang="en-GB" sz="2000" dirty="0">
@@ -6581,6 +6506,86 @@
               <a:ea typeface="Source Sans Pro" panose="020B0503030403020204" pitchFamily="34" charset="0"/>
               <a:cs typeface="Source Sans Pro"/>
             </a:endParaRPr>
+          </a:p>
+          <a:p>
+            <a:pPr marL="800100" lvl="1" indent="-342900" eaLnBrk="0" hangingPunct="0">
+              <a:spcBef>
+                <a:spcPts val="600"/>
+              </a:spcBef>
+              <a:buClr>
+                <a:srgbClr val="C7DE37"/>
+              </a:buClr>
+              <a:buFont typeface="Arial" panose="020B0604020202020204" pitchFamily="34" charset="0"/>
+              <a:buChar char="•"/>
+              <a:tabLst>
+                <a:tab pos="392682" algn="l"/>
+              </a:tabLst>
+            </a:pPr>
+            <a:r>
+              <a:rPr lang="en-GB" sz="2000" i="1" dirty="0" err="1">
+                <a:solidFill>
+                  <a:srgbClr val="60737F"/>
+                </a:solidFill>
+                <a:latin typeface="Source Sans Pro" panose="020B0503030403020204" pitchFamily="34" charset="0"/>
+                <a:ea typeface="Source Sans Pro" panose="020B0503030403020204" pitchFamily="34" charset="0"/>
+                <a:cs typeface="Source Sans Pro"/>
+              </a:rPr>
+              <a:t>oac</a:t>
+            </a:r>
+            <a:r>
+              <a:rPr lang="en-GB" sz="2000" i="1" dirty="0">
+                <a:solidFill>
+                  <a:srgbClr val="60737F"/>
+                </a:solidFill>
+                <a:latin typeface="Source Sans Pro" panose="020B0503030403020204" pitchFamily="34" charset="0"/>
+                <a:ea typeface="Source Sans Pro" panose="020B0503030403020204" pitchFamily="34" charset="0"/>
+                <a:cs typeface="Source Sans Pro"/>
+              </a:rPr>
+              <a:t>-tree</a:t>
+            </a:r>
+            <a:br>
+              <a:rPr lang="en-GB" sz="2000" dirty="0">
+                <a:solidFill>
+                  <a:srgbClr val="60737F"/>
+                </a:solidFill>
+                <a:latin typeface="Source Sans Pro" panose="020B0503030403020204" pitchFamily="34" charset="0"/>
+                <a:ea typeface="Source Sans Pro" panose="020B0503030403020204" pitchFamily="34" charset="0"/>
+                <a:cs typeface="Source Sans Pro"/>
+              </a:rPr>
+            </a:br>
+            <a:r>
+              <a:rPr lang="en-GB" sz="2000" dirty="0">
+                <a:solidFill>
+                  <a:srgbClr val="60737F"/>
+                </a:solidFill>
+                <a:latin typeface="Source Sans Pro" panose="020B0503030403020204" pitchFamily="34" charset="0"/>
+                <a:ea typeface="Source Sans Pro" panose="020B0503030403020204" pitchFamily="34" charset="0"/>
+                <a:cs typeface="Source Sans Pro"/>
+              </a:rPr>
+              <a:t>The </a:t>
+            </a:r>
+            <a:r>
+              <a:rPr lang="en-GB" sz="2000" dirty="0" err="1">
+                <a:solidFill>
+                  <a:srgbClr val="60737F"/>
+                </a:solidFill>
+                <a:latin typeface="Source Sans Pro" panose="020B0503030403020204" pitchFamily="34" charset="0"/>
+                <a:ea typeface="Source Sans Pro" panose="020B0503030403020204" pitchFamily="34" charset="0"/>
+                <a:cs typeface="Source Sans Pro"/>
+              </a:rPr>
+              <a:t>oac</a:t>
+            </a:r>
+            <a:r>
+              <a:rPr lang="en-GB" sz="2000" dirty="0">
+                <a:solidFill>
+                  <a:srgbClr val="60737F"/>
+                </a:solidFill>
+                <a:latin typeface="Source Sans Pro" panose="020B0503030403020204" pitchFamily="34" charset="0"/>
+                <a:ea typeface="Source Sans Pro" panose="020B0503030403020204" pitchFamily="34" charset="0"/>
+                <a:cs typeface="Source Sans Pro"/>
+              </a:rPr>
+              <a:t>-tree sequencer and its GUI application</a:t>
+            </a:r>
           </a:p>
         </p:txBody>
       </p:sp>
@@ -6798,6 +6803,55 @@
                       </p:childTnLst>
                     </p:cTn>
                   </p:par>
+                  <p:par>
+                    <p:cTn id="19" fill="hold">
+                      <p:stCondLst>
+                        <p:cond delay="indefinite"/>
+                      </p:stCondLst>
+                      <p:childTnLst>
+                        <p:par>
+                          <p:cTn id="20" fill="hold">
+                            <p:stCondLst>
+                              <p:cond delay="0"/>
+                            </p:stCondLst>
+                            <p:childTnLst>
+                              <p:par>
+                                <p:cTn id="21" presetID="1" presetClass="entr" presetSubtype="0" fill="hold" nodeType="clickEffect">
+                                  <p:stCondLst>
+                                    <p:cond delay="0"/>
+                                  </p:stCondLst>
+                                  <p:childTnLst>
+                                    <p:set>
+                                      <p:cBhvr>
+                                        <p:cTn id="22" dur="1" fill="hold">
+                                          <p:stCondLst>
+                                            <p:cond delay="0"/>
+                                          </p:stCondLst>
+                                        </p:cTn>
+                                        <p:tgtEl>
+                                          <p:spTgt spid="2">
+                                            <p:txEl>
+                                              <p:pRg st="6" end="6"/>
+                                            </p:txEl>
+                                          </p:spTgt>
+                                        </p:tgtEl>
+                                        <p:attrNameLst>
+                                          <p:attrName>style.visibility</p:attrName>
+                                        </p:attrNameLst>
+                                      </p:cBhvr>
+                                      <p:to>
+                                        <p:strVal val="visible"/>
+                                      </p:to>
+                                    </p:set>
+                                  </p:childTnLst>
+                                </p:cTn>
+                              </p:par>
+                            </p:childTnLst>
+                          </p:cTn>
+                        </p:par>
+                      </p:childTnLst>
+                    </p:cTn>
+                  </p:par>
                 </p:childTnLst>
               </p:cTn>
               <p:prevCondLst>
@@ -6984,7 +7038,7 @@
                 <a:ea typeface="Source Sans Pro" panose="020B0503030403020204" pitchFamily="34" charset="0"/>
                 <a:cs typeface="Source Sans Pro"/>
               </a:rPr>
-              <a:t>This training is called ‘2024-fall-oakridge’</a:t>
+              <a:t>This training is called ‘2025-spring-harwell’</a:t>
             </a:r>
           </a:p>
           <a:p>
@@ -8122,30 +8176,27 @@
                 <a:ea typeface="Milo-Medium"/>
                 <a:cs typeface="Source Sans Pro"/>
               </a:rPr>
-              <a:t>./vm-setup/update.sh</a:t>
-            </a:r>
-            <a:r>
-              <a:rPr lang="en-GB" sz="2000" dirty="0">
-                <a:solidFill>
-                  <a:srgbClr val="60737F"/>
-                </a:solidFill>
-                <a:latin typeface="Source Sans Pro"/>
-                <a:ea typeface="Milo-Medium"/>
-                <a:cs typeface="Source Sans Pro"/>
-              </a:rPr>
-              <a:t> </a:t>
-            </a:r>
-            <a:r>
-              <a:rPr lang="en-GB" sz="2400" dirty="0">
-                <a:solidFill>
-                  <a:srgbClr val="60737F"/>
-                </a:solidFill>
-                <a:latin typeface="Source Sans Pro"/>
-                <a:ea typeface="Milo-Medium"/>
-                <a:cs typeface="Source Sans Pro"/>
-              </a:rPr>
-              <a:t>to:</a:t>
-            </a:r>
+              <a:t>./vm-setup/update</a:t>
+            </a:r>
+            <a:r>
+              <a:rPr lang="en-GB" sz="2000">
+                <a:solidFill>
+                  <a:srgbClr val="60737F"/>
+                </a:solidFill>
+                <a:latin typeface="Lucida Console" panose="020B0609040504020204" pitchFamily="49" charset="0"/>
+                <a:ea typeface="Milo-Medium"/>
+                <a:cs typeface="Source Sans Pro"/>
+              </a:rPr>
+              <a:t>.sh</a:t>
+            </a:r>
+            <a:endParaRPr lang="en-GB" sz="2400" dirty="0">
+              <a:solidFill>
+                <a:srgbClr val="60737F"/>
+              </a:solidFill>
+              <a:latin typeface="Source Sans Pro"/>
+              <a:ea typeface="Milo-Medium"/>
+              <a:cs typeface="Source Sans Pro"/>
+            </a:endParaRPr>
           </a:p>
           <a:p>
             <a:pPr marL="800100" lvl="1" indent="-342900" eaLnBrk="0" hangingPunct="0">
@@ -8444,7 +8495,7 @@
                 <a:ea typeface="Source Sans Pro" panose="020B0503030403020204" pitchFamily="34" charset="0"/>
                 <a:cs typeface="Source Sans Pro"/>
               </a:rPr>
-              <a:t>If you only want to update the application part, it suffices to run</a:t>
+              <a:t>If you only want to update the application part, run</a:t>
             </a:r>
             <a:br>
               <a:rPr lang="en-GB" sz="2400" dirty="0">
@@ -8593,26 +8644,39 @@
                                   </p:childTnLst>
                                 </p:cTn>
                               </p:par>
-                            </p:childTnLst>
-                          </p:cTn>
-                        </p:par>
-                      </p:childTnLst>
-                    </p:cTn>
-                  </p:par>
-                  <p:par>
-                    <p:cTn id="7" fill="hold">
-                      <p:stCondLst>
-                        <p:cond delay="indefinite"/>
-                      </p:stCondLst>
-                      <p:childTnLst>
-                        <p:par>
-                          <p:cTn id="8" fill="hold">
-                            <p:stCondLst>
-                              <p:cond delay="0"/>
-                            </p:stCondLst>
-                            <p:childTnLst>
                               <p:par>
-                                <p:cTn id="9" presetID="1" presetClass="entr" presetSubtype="0" fill="hold" nodeType="clickEffect">
+                                <p:cTn id="7" presetID="1" presetClass="entr" presetSubtype="0" fill="hold" nodeType="withEffect">
+                                  <p:stCondLst>
+                                    <p:cond delay="0"/>
+                                  </p:stCondLst>
+                                  <p:childTnLst>
+                                    <p:set>
+                                      <p:cBhvr>
+                                        <p:cTn id="8" dur="1" fill="hold">
+                                          <p:stCondLst>
+                                            <p:cond delay="0"/>
+                                          </p:stCondLst>
+                                        </p:cTn>
+                                        <p:tgtEl>
+                                          <p:spTgt spid="2">
+                                            <p:txEl>
+                                              <p:pRg st="3" end="3"/>
+                                            </p:txEl>
+                                          </p:spTgt>
+                                        </p:tgtEl>
+                                        <p:attrNameLst>
+                                          <p:attrName>style.visibility</p:attrName>
+                                        </p:attrNameLst>
+                                      </p:cBhvr>
+                                      <p:to>
+                                        <p:strVal val="visible"/>
+                                      </p:to>
+                                    </p:set>
+                                  </p:childTnLst>
+                                </p:cTn>
+                              </p:par>
+                              <p:par>
+                                <p:cTn id="9" presetID="1" presetClass="entr" presetSubtype="0" fill="hold" nodeType="withEffect">
                                   <p:stCondLst>
                                     <p:cond delay="0"/>
                                   </p:stCondLst>
@@ -8627,7 +8691,7 @@
                                         <p:tgtEl>
                                           <p:spTgt spid="2">
                                             <p:txEl>
-                                              <p:pRg st="3" end="3"/>
+                                              <p:pRg st="4" end="4"/>
                                             </p:txEl>
                                           </p:spTgt>
                                         </p:tgtEl>
@@ -8676,7 +8740,7 @@
                                         <p:tgtEl>
                                           <p:spTgt spid="2">
                                             <p:txEl>
-                                              <p:pRg st="4" end="4"/>
+                                              <p:pRg st="5" end="5"/>
                                             </p:txEl>
                                           </p:spTgt>
                                         </p:tgtEl>
@@ -8718,55 +8782,6 @@
                                     <p:set>
                                       <p:cBhvr>
                                         <p:cTn id="18" dur="1" fill="hold">
-                                          <p:stCondLst>
-                                            <p:cond delay="0"/>
-                                          </p:stCondLst>
-                                        </p:cTn>
-                                        <p:tgtEl>
-                                          <p:spTgt spid="2">
-                                            <p:txEl>
-                                              <p:pRg st="5" end="5"/>
-                                            </p:txEl>
-                                          </p:spTgt>
-                                        </p:tgtEl>
-                                        <p:attrNameLst>
-                                          <p:attrName>style.visibility</p:attrName>
-                                        </p:attrNameLst>
-                                      </p:cBhvr>
-                                      <p:to>
-                                        <p:strVal val="visible"/>
-                                      </p:to>
-                                    </p:set>
-                                  </p:childTnLst>
-                                </p:cTn>
-                              </p:par>
-                            </p:childTnLst>
-                          </p:cTn>
-                        </p:par>
-                      </p:childTnLst>
-                    </p:cTn>
-                  </p:par>
-                  <p:par>
-                    <p:cTn id="19" fill="hold">
-                      <p:stCondLst>
-                        <p:cond delay="indefinite"/>
-                      </p:stCondLst>
-                      <p:childTnLst>
-                        <p:par>
-                          <p:cTn id="20" fill="hold">
-                            <p:stCondLst>
-                              <p:cond delay="0"/>
-                            </p:stCondLst>
-                            <p:childTnLst>
-                              <p:par>
-                                <p:cTn id="21" presetID="1" presetClass="entr" presetSubtype="0" fill="hold" nodeType="clickEffect">
-                                  <p:stCondLst>
-                                    <p:cond delay="0"/>
-                                  </p:stCondLst>
-                                  <p:childTnLst>
-                                    <p:set>
-                                      <p:cBhvr>
-                                        <p:cTn id="22" dur="1" fill="hold">
                                           <p:stCondLst>
                                             <p:cond delay="0"/>
                                           </p:stCondLst>

</xml_diff>